<commit_message>
Increase to 5 ports tested
</commit_message>
<xml_diff>
--- a/switch_config.pptx
+++ b/switch_config.pptx
@@ -104,6 +104,11 @@
       </a:defRPr>
     </a:lvl9pPr>
   </p:defaultTextStyle>
+  <p:extLst>
+    <p:ext uri="{EFAFB233-063F-42B5-8137-9DF3F51BA10A}">
+      <p15:sldGuideLst xmlns:p15="http://schemas.microsoft.com/office/powerpoint/2012/main"/>
+    </p:ext>
+  </p:extLst>
 </p:presentation>
 </file>
 
@@ -3368,8 +3373,8 @@
         </p:nvSpPr>
         <p:spPr>
           <a:xfrm>
-            <a:off x="4578567" y="1393157"/>
-            <a:ext cx="3231541" cy="3320715"/>
+            <a:off x="4578567" y="569495"/>
+            <a:ext cx="3231541" cy="4144377"/>
           </a:xfrm>
           <a:prstGeom prst="rect">
             <a:avLst/>
@@ -3392,7 +3397,7 @@
           </a:fontRef>
         </p:style>
         <p:txBody>
-          <a:bodyPr rtlCol="0" anchor="ctr"/>
+          <a:bodyPr rtlCol="0" anchor="t"/>
           <a:lstStyle/>
           <a:p>
             <a:pPr algn="ctr"/>
@@ -3544,7 +3549,7 @@
         </p:nvSpPr>
         <p:spPr>
           <a:xfrm>
-            <a:off x="4643454" y="3511114"/>
+            <a:off x="4635433" y="3511114"/>
             <a:ext cx="1729540" cy="1200329"/>
           </a:xfrm>
           <a:prstGeom prst="rect">
@@ -3567,7 +3572,7 @@
             </a:br>
             <a:r>
               <a:rPr lang="en-GB" dirty="0"/>
-              <a:t>member of VLANs 9,11,13,15</a:t>
+              <a:t>member of VLANs 7,9,11,13,15</a:t>
             </a:r>
           </a:p>
         </p:txBody>
@@ -3586,8 +3591,8 @@
         </p:nvSpPr>
         <p:spPr>
           <a:xfrm>
-            <a:off x="8953500" y="1393157"/>
-            <a:ext cx="2914650" cy="3320715"/>
+            <a:off x="8953500" y="569495"/>
+            <a:ext cx="2914650" cy="4144377"/>
           </a:xfrm>
           <a:prstGeom prst="rect">
             <a:avLst/>
@@ -3809,7 +3814,7 @@
         </p:nvSpPr>
         <p:spPr>
           <a:xfrm>
-            <a:off x="8006782" y="1469294"/>
+            <a:off x="8006781" y="857091"/>
             <a:ext cx="732893" cy="369332"/>
           </a:xfrm>
           <a:prstGeom prst="rect">
@@ -4099,6 +4104,123 @@
             <a:r>
               <a:rPr lang="en-GB" dirty="0"/>
               <a:t>of VLAN 15</a:t>
+            </a:r>
+          </a:p>
+        </p:txBody>
+      </p:sp>
+      <p:cxnSp>
+        <p:nvCxnSpPr>
+          <p:cNvPr id="3" name="Straight Arrow Connector 2">
+            <a:extLst>
+              <a:ext uri="{FF2B5EF4-FFF2-40B4-BE49-F238E27FC236}">
+                <a16:creationId xmlns:a16="http://schemas.microsoft.com/office/drawing/2014/main" id="{DCEDAD5F-F6DD-42F3-BB83-0A1346F77048}"/>
+              </a:ext>
+            </a:extLst>
+          </p:cNvPr>
+          <p:cNvCxnSpPr/>
+          <p:nvPr/>
+        </p:nvCxnSpPr>
+        <p:spPr>
+          <a:xfrm>
+            <a:off x="7801532" y="1128453"/>
+            <a:ext cx="1143392" cy="0"/>
+          </a:xfrm>
+          <a:prstGeom prst="straightConnector1">
+            <a:avLst/>
+          </a:prstGeom>
+          <a:ln>
+            <a:headEnd type="triangle"/>
+            <a:tailEnd type="triangle"/>
+          </a:ln>
+        </p:spPr>
+        <p:style>
+          <a:lnRef idx="1">
+            <a:schemeClr val="accent1"/>
+          </a:lnRef>
+          <a:fillRef idx="0">
+            <a:schemeClr val="accent1"/>
+          </a:fillRef>
+          <a:effectRef idx="0">
+            <a:schemeClr val="accent1"/>
+          </a:effectRef>
+          <a:fontRef idx="minor">
+            <a:schemeClr val="tx1"/>
+          </a:fontRef>
+        </p:style>
+      </p:cxnSp>
+      <p:sp>
+        <p:nvSpPr>
+          <p:cNvPr id="36" name="TextBox 35">
+            <a:extLst>
+              <a:ext uri="{FF2B5EF4-FFF2-40B4-BE49-F238E27FC236}">
+                <a16:creationId xmlns:a16="http://schemas.microsoft.com/office/drawing/2014/main" id="{22371012-C95D-4D09-9B87-C294BD46FFD9}"/>
+              </a:ext>
+            </a:extLst>
+          </p:cNvPr>
+          <p:cNvSpPr txBox="1"/>
+          <p:nvPr/>
+        </p:nvSpPr>
+        <p:spPr>
+          <a:xfrm>
+            <a:off x="8046990" y="1503719"/>
+            <a:ext cx="732893" cy="369332"/>
+          </a:xfrm>
+          <a:prstGeom prst="rect">
+            <a:avLst/>
+          </a:prstGeom>
+          <a:noFill/>
+        </p:spPr>
+        <p:txBody>
+          <a:bodyPr wrap="none" rtlCol="0">
+            <a:spAutoFit/>
+          </a:bodyPr>
+          <a:lstStyle/>
+          <a:p>
+            <a:r>
+              <a:rPr lang="en-GB" dirty="0"/>
+              <a:t>100M</a:t>
+            </a:r>
+          </a:p>
+        </p:txBody>
+      </p:sp>
+      <p:sp>
+        <p:nvSpPr>
+          <p:cNvPr id="37" name="TextBox 36">
+            <a:extLst>
+              <a:ext uri="{FF2B5EF4-FFF2-40B4-BE49-F238E27FC236}">
+                <a16:creationId xmlns:a16="http://schemas.microsoft.com/office/drawing/2014/main" id="{B368F2F5-BE7E-4275-B99A-6B91668A08C6}"/>
+              </a:ext>
+            </a:extLst>
+          </p:cNvPr>
+          <p:cNvSpPr txBox="1"/>
+          <p:nvPr/>
+        </p:nvSpPr>
+        <p:spPr>
+          <a:xfrm>
+            <a:off x="5953439" y="884667"/>
+            <a:ext cx="1946430" cy="646331"/>
+          </a:xfrm>
+          <a:prstGeom prst="rect">
+            <a:avLst/>
+          </a:prstGeom>
+          <a:noFill/>
+        </p:spPr>
+        <p:txBody>
+          <a:bodyPr wrap="none" rtlCol="0">
+            <a:spAutoFit/>
+          </a:bodyPr>
+          <a:lstStyle/>
+          <a:p>
+            <a:r>
+              <a:rPr lang="en-GB" dirty="0"/>
+              <a:t>Untagged member</a:t>
+            </a:r>
+            <a:br>
+              <a:rPr lang="en-GB" dirty="0"/>
+            </a:br>
+            <a:r>
+              <a:rPr lang="en-GB" dirty="0"/>
+              <a:t>of VLAN 7</a:t>
             </a:r>
           </a:p>
         </p:txBody>

</xml_diff>

<commit_message>
Increase to 7 ports tested
</commit_message>
<xml_diff>
--- a/switch_config.pptx
+++ b/switch_config.pptx
@@ -3374,7 +3374,7 @@
         <p:spPr>
           <a:xfrm>
             <a:off x="4578567" y="569495"/>
-            <a:ext cx="3231541" cy="4144377"/>
+            <a:ext cx="3231541" cy="5077326"/>
           </a:xfrm>
           <a:prstGeom prst="rect">
             <a:avLst/>
@@ -3402,9 +3402,10 @@
           <a:p>
             <a:pPr algn="ctr"/>
             <a:r>
-              <a:rPr lang="en-GB" dirty="0"/>
+              <a:rPr lang="en-GB"/>
               <a:t>Injection switch</a:t>
             </a:r>
+            <a:endParaRPr lang="en-GB" dirty="0"/>
           </a:p>
         </p:txBody>
       </p:sp>
@@ -3550,7 +3551,7 @@
         <p:spPr>
           <a:xfrm>
             <a:off x="4635433" y="3511114"/>
-            <a:ext cx="1729540" cy="1200329"/>
+            <a:ext cx="1729540" cy="1477328"/>
           </a:xfrm>
           <a:prstGeom prst="rect">
             <a:avLst/>
@@ -3572,7 +3573,28 @@
             </a:br>
             <a:r>
               <a:rPr lang="en-GB" dirty="0"/>
-              <a:t>member of VLANs 7,9,11,13,15</a:t>
+              <a:t>member</a:t>
+            </a:r>
+            <a:br>
+              <a:rPr lang="en-GB" dirty="0"/>
+            </a:br>
+            <a:r>
+              <a:rPr lang="en-GB" dirty="0"/>
+              <a:t>of VLANs</a:t>
+            </a:r>
+            <a:br>
+              <a:rPr lang="en-GB" dirty="0"/>
+            </a:br>
+            <a:r>
+              <a:rPr lang="en-GB" dirty="0"/>
+              <a:t>3,5,7,9,</a:t>
+            </a:r>
+            <a:br>
+              <a:rPr lang="en-GB" dirty="0"/>
+            </a:br>
+            <a:r>
+              <a:rPr lang="en-GB" dirty="0"/>
+              <a:t>11,13,15</a:t>
             </a:r>
           </a:p>
         </p:txBody>
@@ -3592,7 +3614,7 @@
         <p:spPr>
           <a:xfrm>
             <a:off x="8953500" y="569495"/>
-            <a:ext cx="2914650" cy="4144377"/>
+            <a:ext cx="2914650" cy="5077324"/>
           </a:xfrm>
           <a:prstGeom prst="rect">
             <a:avLst/>
@@ -3694,7 +3716,7 @@
         </p:nvCxnSpPr>
         <p:spPr>
           <a:xfrm>
-            <a:off x="7810108" y="3524250"/>
+            <a:off x="7801531" y="3282605"/>
             <a:ext cx="1143392" cy="0"/>
           </a:xfrm>
           <a:prstGeom prst="straightConnector1">
@@ -3734,7 +3756,7 @@
         </p:nvCxnSpPr>
         <p:spPr>
           <a:xfrm>
-            <a:off x="7810108" y="4448175"/>
+            <a:off x="7801774" y="3998996"/>
             <a:ext cx="1143392" cy="0"/>
           </a:xfrm>
           <a:prstGeom prst="straightConnector1">
@@ -3884,7 +3906,7 @@
         </p:nvSpPr>
         <p:spPr>
           <a:xfrm>
-            <a:off x="8023933" y="3249868"/>
+            <a:off x="8002232" y="2953324"/>
             <a:ext cx="732893" cy="369332"/>
           </a:xfrm>
           <a:prstGeom prst="rect">
@@ -3919,7 +3941,7 @@
         </p:nvSpPr>
         <p:spPr>
           <a:xfrm>
-            <a:off x="8023933" y="4167960"/>
+            <a:off x="8006781" y="3692335"/>
             <a:ext cx="732893" cy="369332"/>
           </a:xfrm>
           <a:prstGeom prst="rect">
@@ -3977,7 +3999,7 @@
             </a:br>
             <a:r>
               <a:rPr lang="en-GB" dirty="0"/>
-              <a:t>of VLAN 9</a:t>
+              <a:t>of VLAN 5</a:t>
             </a:r>
           </a:p>
         </p:txBody>
@@ -4019,7 +4041,7 @@
             </a:br>
             <a:r>
               <a:rPr lang="en-GB" dirty="0"/>
-              <a:t>of VLAN 11</a:t>
+              <a:t>of VLAN 7</a:t>
             </a:r>
           </a:p>
         </p:txBody>
@@ -4038,7 +4060,7 @@
         </p:nvSpPr>
         <p:spPr>
           <a:xfrm>
-            <a:off x="5904609" y="3151715"/>
+            <a:off x="5904609" y="2957334"/>
             <a:ext cx="1946430" cy="646331"/>
           </a:xfrm>
           <a:prstGeom prst="rect">
@@ -4061,7 +4083,7 @@
             </a:br>
             <a:r>
               <a:rPr lang="en-GB" dirty="0"/>
-              <a:t>of VLAN 13</a:t>
+              <a:t>of VLAN 9</a:t>
             </a:r>
           </a:p>
         </p:txBody>
@@ -4080,7 +4102,7 @@
         </p:nvSpPr>
         <p:spPr>
           <a:xfrm>
-            <a:off x="5926943" y="3984139"/>
+            <a:off x="5860264" y="3682563"/>
             <a:ext cx="1946430" cy="646331"/>
           </a:xfrm>
           <a:prstGeom prst="rect">
@@ -4103,7 +4125,7 @@
             </a:br>
             <a:r>
               <a:rPr lang="en-GB" dirty="0"/>
-              <a:t>of VLAN 15</a:t>
+              <a:t>of VLAN 11</a:t>
             </a:r>
           </a:p>
         </p:txBody>
@@ -4220,7 +4242,241 @@
             </a:br>
             <a:r>
               <a:rPr lang="en-GB" dirty="0"/>
-              <a:t>of VLAN 7</a:t>
+              <a:t>of VLAN 3</a:t>
+            </a:r>
+          </a:p>
+        </p:txBody>
+      </p:sp>
+      <p:cxnSp>
+        <p:nvCxnSpPr>
+          <p:cNvPr id="9" name="Straight Arrow Connector 8">
+            <a:extLst>
+              <a:ext uri="{FF2B5EF4-FFF2-40B4-BE49-F238E27FC236}">
+                <a16:creationId xmlns:a16="http://schemas.microsoft.com/office/drawing/2014/main" id="{DE36CFEE-8343-4F5E-AA86-39EB2C1DFB99}"/>
+              </a:ext>
+            </a:extLst>
+          </p:cNvPr>
+          <p:cNvCxnSpPr/>
+          <p:nvPr/>
+        </p:nvCxnSpPr>
+        <p:spPr>
+          <a:xfrm>
+            <a:off x="7810108" y="4636168"/>
+            <a:ext cx="1134815" cy="0"/>
+          </a:xfrm>
+          <a:prstGeom prst="straightConnector1">
+            <a:avLst/>
+          </a:prstGeom>
+          <a:ln>
+            <a:headEnd type="triangle"/>
+            <a:tailEnd type="triangle"/>
+          </a:ln>
+        </p:spPr>
+        <p:style>
+          <a:lnRef idx="1">
+            <a:schemeClr val="accent1"/>
+          </a:lnRef>
+          <a:fillRef idx="0">
+            <a:schemeClr val="accent1"/>
+          </a:fillRef>
+          <a:effectRef idx="0">
+            <a:schemeClr val="accent1"/>
+          </a:effectRef>
+          <a:fontRef idx="minor">
+            <a:schemeClr val="tx1"/>
+          </a:fontRef>
+        </p:style>
+      </p:cxnSp>
+      <p:cxnSp>
+        <p:nvCxnSpPr>
+          <p:cNvPr id="11" name="Straight Arrow Connector 10">
+            <a:extLst>
+              <a:ext uri="{FF2B5EF4-FFF2-40B4-BE49-F238E27FC236}">
+                <a16:creationId xmlns:a16="http://schemas.microsoft.com/office/drawing/2014/main" id="{10FD2B4A-6A16-4632-B702-97CD060DC817}"/>
+              </a:ext>
+            </a:extLst>
+          </p:cNvPr>
+          <p:cNvCxnSpPr/>
+          <p:nvPr/>
+        </p:nvCxnSpPr>
+        <p:spPr>
+          <a:xfrm>
+            <a:off x="7810108" y="5382126"/>
+            <a:ext cx="1134815" cy="0"/>
+          </a:xfrm>
+          <a:prstGeom prst="straightConnector1">
+            <a:avLst/>
+          </a:prstGeom>
+          <a:ln>
+            <a:headEnd type="triangle"/>
+            <a:tailEnd type="triangle"/>
+          </a:ln>
+        </p:spPr>
+        <p:style>
+          <a:lnRef idx="1">
+            <a:schemeClr val="accent1"/>
+          </a:lnRef>
+          <a:fillRef idx="0">
+            <a:schemeClr val="accent1"/>
+          </a:fillRef>
+          <a:effectRef idx="0">
+            <a:schemeClr val="accent1"/>
+          </a:effectRef>
+          <a:fontRef idx="minor">
+            <a:schemeClr val="tx1"/>
+          </a:fontRef>
+        </p:style>
+      </p:cxnSp>
+      <p:sp>
+        <p:nvSpPr>
+          <p:cNvPr id="40" name="TextBox 39">
+            <a:extLst>
+              <a:ext uri="{FF2B5EF4-FFF2-40B4-BE49-F238E27FC236}">
+                <a16:creationId xmlns:a16="http://schemas.microsoft.com/office/drawing/2014/main" id="{830FFCE8-6AD5-44EB-A84C-E396584DD2EF}"/>
+              </a:ext>
+            </a:extLst>
+          </p:cNvPr>
+          <p:cNvSpPr txBox="1"/>
+          <p:nvPr/>
+        </p:nvSpPr>
+        <p:spPr>
+          <a:xfrm>
+            <a:off x="5814985" y="4356104"/>
+            <a:ext cx="1946430" cy="646331"/>
+          </a:xfrm>
+          <a:prstGeom prst="rect">
+            <a:avLst/>
+          </a:prstGeom>
+          <a:noFill/>
+        </p:spPr>
+        <p:txBody>
+          <a:bodyPr wrap="none" rtlCol="0">
+            <a:spAutoFit/>
+          </a:bodyPr>
+          <a:lstStyle/>
+          <a:p>
+            <a:r>
+              <a:rPr lang="en-GB" dirty="0"/>
+              <a:t>Untagged member</a:t>
+            </a:r>
+            <a:br>
+              <a:rPr lang="en-GB" dirty="0"/>
+            </a:br>
+            <a:r>
+              <a:rPr lang="en-GB" dirty="0"/>
+              <a:t>of VLAN 13</a:t>
+            </a:r>
+          </a:p>
+        </p:txBody>
+      </p:sp>
+      <p:sp>
+        <p:nvSpPr>
+          <p:cNvPr id="41" name="TextBox 40">
+            <a:extLst>
+              <a:ext uri="{FF2B5EF4-FFF2-40B4-BE49-F238E27FC236}">
+                <a16:creationId xmlns:a16="http://schemas.microsoft.com/office/drawing/2014/main" id="{6D45E33D-79ED-4C1A-8E3A-E40324008814}"/>
+              </a:ext>
+            </a:extLst>
+          </p:cNvPr>
+          <p:cNvSpPr txBox="1"/>
+          <p:nvPr/>
+        </p:nvSpPr>
+        <p:spPr>
+          <a:xfrm>
+            <a:off x="5814985" y="5036699"/>
+            <a:ext cx="1946430" cy="646331"/>
+          </a:xfrm>
+          <a:prstGeom prst="rect">
+            <a:avLst/>
+          </a:prstGeom>
+          <a:noFill/>
+        </p:spPr>
+        <p:txBody>
+          <a:bodyPr wrap="none" rtlCol="0">
+            <a:spAutoFit/>
+          </a:bodyPr>
+          <a:lstStyle/>
+          <a:p>
+            <a:r>
+              <a:rPr lang="en-GB" dirty="0"/>
+              <a:t>Untagged member</a:t>
+            </a:r>
+            <a:br>
+              <a:rPr lang="en-GB" dirty="0"/>
+            </a:br>
+            <a:r>
+              <a:rPr lang="en-GB" dirty="0"/>
+              <a:t>of VLAN 15</a:t>
+            </a:r>
+          </a:p>
+        </p:txBody>
+      </p:sp>
+      <p:sp>
+        <p:nvSpPr>
+          <p:cNvPr id="42" name="TextBox 41">
+            <a:extLst>
+              <a:ext uri="{FF2B5EF4-FFF2-40B4-BE49-F238E27FC236}">
+                <a16:creationId xmlns:a16="http://schemas.microsoft.com/office/drawing/2014/main" id="{5A25A009-4034-4908-BEB1-D2302ECB16A6}"/>
+              </a:ext>
+            </a:extLst>
+          </p:cNvPr>
+          <p:cNvSpPr txBox="1"/>
+          <p:nvPr/>
+        </p:nvSpPr>
+        <p:spPr>
+          <a:xfrm>
+            <a:off x="7990624" y="4311492"/>
+            <a:ext cx="732893" cy="369332"/>
+          </a:xfrm>
+          <a:prstGeom prst="rect">
+            <a:avLst/>
+          </a:prstGeom>
+          <a:noFill/>
+        </p:spPr>
+        <p:txBody>
+          <a:bodyPr wrap="none" rtlCol="0">
+            <a:spAutoFit/>
+          </a:bodyPr>
+          <a:lstStyle/>
+          <a:p>
+            <a:r>
+              <a:rPr lang="en-GB" dirty="0"/>
+              <a:t>100M</a:t>
+            </a:r>
+          </a:p>
+        </p:txBody>
+      </p:sp>
+      <p:sp>
+        <p:nvSpPr>
+          <p:cNvPr id="43" name="TextBox 42">
+            <a:extLst>
+              <a:ext uri="{FF2B5EF4-FFF2-40B4-BE49-F238E27FC236}">
+                <a16:creationId xmlns:a16="http://schemas.microsoft.com/office/drawing/2014/main" id="{350899D9-BA10-415D-8337-F2FDB022B9C6}"/>
+              </a:ext>
+            </a:extLst>
+          </p:cNvPr>
+          <p:cNvSpPr txBox="1"/>
+          <p:nvPr/>
+        </p:nvSpPr>
+        <p:spPr>
+          <a:xfrm>
+            <a:off x="7990624" y="5058270"/>
+            <a:ext cx="732893" cy="369332"/>
+          </a:xfrm>
+          <a:prstGeom prst="rect">
+            <a:avLst/>
+          </a:prstGeom>
+          <a:noFill/>
+        </p:spPr>
+        <p:txBody>
+          <a:bodyPr wrap="none" rtlCol="0">
+            <a:spAutoFit/>
+          </a:bodyPr>
+          <a:lstStyle/>
+          <a:p>
+            <a:r>
+              <a:rPr lang="en-GB" dirty="0"/>
+              <a:t>100M</a:t>
             </a:r>
           </a:p>
         </p:txBody>

</xml_diff>